<commit_message>
Lecture 2, code examples for Lecture 2
</commit_message>
<xml_diff>
--- a/w1/l1/Mobile-and-Embedded-Computing-Lab1.pptx
+++ b/w1/l1/Mobile-and-Embedded-Computing-Lab1.pptx
@@ -4205,8 +4205,8 @@
         </p:nvSpPr>
         <p:spPr>
           <a:xfrm>
-            <a:off x="827186" y="612844"/>
-            <a:ext cx="10537627" cy="5632311"/>
+            <a:off x="827186" y="243512"/>
+            <a:ext cx="10537627" cy="6370975"/>
           </a:xfrm>
           <a:prstGeom prst="rect">
             <a:avLst/>
@@ -4225,7 +4225,11 @@
             </a:pPr>
             <a:r>
               <a:rPr lang="en-US" sz="2400" dirty="0"/>
-              <a:t> Projects MUST be developed on GitHub</a:t>
+              <a:t> Project development MUST be </a:t>
+            </a:r>
+            <a:r>
+              <a:rPr lang="en-US" sz="2400" b="1" dirty="0"/>
+              <a:t>tracked on GitHub</a:t>
             </a:r>
           </a:p>
           <a:p>
@@ -4235,7 +4239,11 @@
             </a:pPr>
             <a:r>
               <a:rPr lang="en-US" sz="2400" dirty="0"/>
-              <a:t> The application MUST be written in Flutter</a:t>
+              <a:t> The application MUST be </a:t>
+            </a:r>
+            <a:r>
+              <a:rPr lang="en-US" sz="2400" b="1" dirty="0"/>
+              <a:t>written in Flutter</a:t>
             </a:r>
           </a:p>
           <a:p>
@@ -4245,7 +4253,7 @@
             </a:pPr>
             <a:r>
               <a:rPr lang="en-US" sz="2400" dirty="0"/>
-              <a:t> The way of working will also be marked (Pull Requests, Branches, Code reviews, etc.)</a:t>
+              <a:t> The way of working will also be marked (Pull Requests, Branches, Code reviews, GitHub Issues, etc.)</a:t>
             </a:r>
           </a:p>
           <a:p>
@@ -4255,7 +4263,23 @@
             </a:pPr>
             <a:r>
               <a:rPr lang="en-US" sz="2400" dirty="0"/>
-              <a:t> Individual participation will be measured based on Commits and Lines of Code, as well as the quality of the code written. Each team member should know in detail what he has implemented and have at least a brief awareness of the other parts of the project</a:t>
+              <a:t> Individual participation will be measured based on Commits, Lines of Code, and the quality of the code written. </a:t>
+            </a:r>
+            <a:r>
+              <a:rPr lang="en-US" sz="2400" b="1" dirty="0"/>
+              <a:t>Each team member </a:t>
+            </a:r>
+            <a:r>
+              <a:rPr lang="en-US" sz="2400" dirty="0"/>
+              <a:t>should know </a:t>
+            </a:r>
+            <a:r>
+              <a:rPr lang="en-US" sz="2400" b="1" dirty="0"/>
+              <a:t>in detail what he has implemented</a:t>
+            </a:r>
+            <a:r>
+              <a:rPr lang="en-US" sz="2400" dirty="0"/>
+              <a:t> and have at least a brief awareness of the other parts of the project</a:t>
             </a:r>
           </a:p>
           <a:p>
@@ -4341,7 +4365,7 @@
             </a:r>
             <a:r>
               <a:rPr lang="en-US" sz="2400" dirty="0"/>
-              <a:t>The final presentation will be a live demo accompanied by slides, and must not take more than 15 minutes / team</a:t>
+              <a:t>The final presentation will be a live demo accompanied by slides and must not take more than 15 minutes / team. Questions will be asked based on the code; you should NOT copy entire projects from the internet and you should not vibe code stuff that you can’t explain later.</a:t>
             </a:r>
             <a:endParaRPr lang="en-US" sz="2400" b="1" dirty="0"/>
           </a:p>

</xml_diff>

<commit_message>
Lecture 2, code examples for Lecture 2, Laboratory 2
</commit_message>
<xml_diff>
--- a/w1/l1/Mobile-and-Embedded-Computing-Lab1.pptx
+++ b/w1/l1/Mobile-and-Embedded-Computing-Lab1.pptx
@@ -210,7 +210,7 @@
           <a:p>
             <a:fld id="{03371807-75D2-4B48-9BC1-C0791C7EACC9}" type="datetimeFigureOut">
               <a:rPr lang="en-US" smtClean="0"/>
-              <a:t>9/20/25</a:t>
+              <a:t>9/23/25</a:t>
             </a:fld>
             <a:endParaRPr lang="en-US"/>
           </a:p>
@@ -624,7 +624,7 @@
           <a:p>
             <a:fld id="{779551AF-0EE3-DD4B-B4EF-6D8229EA0D86}" type="datetimeFigureOut">
               <a:rPr lang="en-US" smtClean="0"/>
-              <a:t>9/20/25</a:t>
+              <a:t>9/23/25</a:t>
             </a:fld>
             <a:endParaRPr lang="en-US"/>
           </a:p>
@@ -822,7 +822,7 @@
           <a:p>
             <a:fld id="{779551AF-0EE3-DD4B-B4EF-6D8229EA0D86}" type="datetimeFigureOut">
               <a:rPr lang="en-US" smtClean="0"/>
-              <a:t>9/20/25</a:t>
+              <a:t>9/23/25</a:t>
             </a:fld>
             <a:endParaRPr lang="en-US"/>
           </a:p>
@@ -1030,7 +1030,7 @@
           <a:p>
             <a:fld id="{779551AF-0EE3-DD4B-B4EF-6D8229EA0D86}" type="datetimeFigureOut">
               <a:rPr lang="en-US" smtClean="0"/>
-              <a:t>9/20/25</a:t>
+              <a:t>9/23/25</a:t>
             </a:fld>
             <a:endParaRPr lang="en-US"/>
           </a:p>
@@ -1228,7 +1228,7 @@
           <a:p>
             <a:fld id="{779551AF-0EE3-DD4B-B4EF-6D8229EA0D86}" type="datetimeFigureOut">
               <a:rPr lang="en-US" smtClean="0"/>
-              <a:t>9/20/25</a:t>
+              <a:t>9/23/25</a:t>
             </a:fld>
             <a:endParaRPr lang="en-US"/>
           </a:p>
@@ -1503,7 +1503,7 @@
           <a:p>
             <a:fld id="{779551AF-0EE3-DD4B-B4EF-6D8229EA0D86}" type="datetimeFigureOut">
               <a:rPr lang="en-US" smtClean="0"/>
-              <a:t>9/20/25</a:t>
+              <a:t>9/23/25</a:t>
             </a:fld>
             <a:endParaRPr lang="en-US"/>
           </a:p>
@@ -1768,7 +1768,7 @@
           <a:p>
             <a:fld id="{779551AF-0EE3-DD4B-B4EF-6D8229EA0D86}" type="datetimeFigureOut">
               <a:rPr lang="en-US" smtClean="0"/>
-              <a:t>9/20/25</a:t>
+              <a:t>9/23/25</a:t>
             </a:fld>
             <a:endParaRPr lang="en-US"/>
           </a:p>
@@ -2180,7 +2180,7 @@
           <a:p>
             <a:fld id="{779551AF-0EE3-DD4B-B4EF-6D8229EA0D86}" type="datetimeFigureOut">
               <a:rPr lang="en-US" smtClean="0"/>
-              <a:t>9/20/25</a:t>
+              <a:t>9/23/25</a:t>
             </a:fld>
             <a:endParaRPr lang="en-US"/>
           </a:p>
@@ -2321,7 +2321,7 @@
           <a:p>
             <a:fld id="{779551AF-0EE3-DD4B-B4EF-6D8229EA0D86}" type="datetimeFigureOut">
               <a:rPr lang="en-US" smtClean="0"/>
-              <a:t>9/20/25</a:t>
+              <a:t>9/23/25</a:t>
             </a:fld>
             <a:endParaRPr lang="en-US"/>
           </a:p>
@@ -2434,7 +2434,7 @@
           <a:p>
             <a:fld id="{779551AF-0EE3-DD4B-B4EF-6D8229EA0D86}" type="datetimeFigureOut">
               <a:rPr lang="en-US" smtClean="0"/>
-              <a:t>9/20/25</a:t>
+              <a:t>9/23/25</a:t>
             </a:fld>
             <a:endParaRPr lang="en-US"/>
           </a:p>
@@ -2745,7 +2745,7 @@
           <a:p>
             <a:fld id="{779551AF-0EE3-DD4B-B4EF-6D8229EA0D86}" type="datetimeFigureOut">
               <a:rPr lang="en-US" smtClean="0"/>
-              <a:t>9/20/25</a:t>
+              <a:t>9/23/25</a:t>
             </a:fld>
             <a:endParaRPr lang="en-US"/>
           </a:p>
@@ -3033,7 +3033,7 @@
           <a:p>
             <a:fld id="{779551AF-0EE3-DD4B-B4EF-6D8229EA0D86}" type="datetimeFigureOut">
               <a:rPr lang="en-US" smtClean="0"/>
-              <a:t>9/20/25</a:t>
+              <a:t>9/23/25</a:t>
             </a:fld>
             <a:endParaRPr lang="en-US"/>
           </a:p>
@@ -3274,7 +3274,7 @@
           <a:p>
             <a:fld id="{779551AF-0EE3-DD4B-B4EF-6D8229EA0D86}" type="datetimeFigureOut">
               <a:rPr lang="en-US" smtClean="0"/>
-              <a:t>9/20/25</a:t>
+              <a:t>9/23/25</a:t>
             </a:fld>
             <a:endParaRPr lang="en-US"/>
           </a:p>
@@ -4542,7 +4542,7 @@
         <p:spPr>
           <a:xfrm>
             <a:off x="903006" y="1541721"/>
-            <a:ext cx="10537627" cy="3970318"/>
+            <a:ext cx="10537627" cy="4401205"/>
           </a:xfrm>
           <a:prstGeom prst="rect">
             <a:avLst/>
@@ -4581,7 +4581,7 @@
             </a:r>
             <a:r>
               <a:rPr lang="en-US" sz="2800" dirty="0"/>
-              <a:t>)</a:t>
+              <a:t>) (Click on Install Manually in the Install Flutter section)</a:t>
             </a:r>
           </a:p>
           <a:p>

</xml_diff>